<commit_message>
Updating Lesson 20 slides.
</commit_message>
<xml_diff>
--- a/notes/L20/Lsn20.pptx
+++ b/notes/L20/Lsn20.pptx
@@ -3897,7 +3897,7 @@
                   <a:srgbClr val="0070C0"/>
                 </a:solidFill>
               </a:rPr>
-              <a:t>Assignment 5 due BOC </a:t>
+              <a:t>Assignment 6</a:t>
             </a:r>
             <a:r>
               <a:rPr lang="en-US" sz="2000" dirty="0" smtClean="0">
@@ -3905,6 +3905,22 @@
                   <a:srgbClr val="0070C0"/>
                 </a:solidFill>
               </a:rPr>
+              <a:t> </a:t>
+            </a:r>
+            <a:r>
+              <a:rPr lang="en-US" sz="2000" dirty="0">
+                <a:solidFill>
+                  <a:srgbClr val="0070C0"/>
+                </a:solidFill>
+              </a:rPr>
+              <a:t>due BOC </a:t>
+            </a:r>
+            <a:r>
+              <a:rPr lang="en-US" sz="2000" dirty="0" smtClean="0">
+                <a:solidFill>
+                  <a:srgbClr val="0070C0"/>
+                </a:solidFill>
+              </a:rPr>
               <a:t>today</a:t>
             </a:r>
           </a:p>
@@ -3916,7 +3932,7 @@
                   <a:srgbClr val="0070C0"/>
                 </a:solidFill>
               </a:rPr>
-              <a:t>Lab 3 functionality/report due COB T21</a:t>
+              <a:t>Lab 3 Notebook Due COB today</a:t>
             </a:r>
           </a:p>
           <a:p>
@@ -3927,7 +3943,7 @@
                   <a:srgbClr val="0070C0"/>
                 </a:solidFill>
               </a:rPr>
-              <a:t>Assignment 6 due BOC next lesson</a:t>
+              <a:t>Assignment 7 due BOC next lesson</a:t>
             </a:r>
             <a:endParaRPr lang="en-US" sz="1600" dirty="0">
               <a:solidFill>
@@ -5558,7 +5574,11 @@
           <a:p>
             <a:r>
               <a:rPr lang="en-US" b="1" dirty="0" smtClean="0"/>
-              <a:t>Assignment 6</a:t>
+              <a:t>Assignment </a:t>
+            </a:r>
+            <a:r>
+              <a:rPr lang="en-US" b="1" dirty="0" smtClean="0"/>
+              <a:t>7</a:t>
             </a:r>
             <a:endParaRPr lang="en-US" dirty="0"/>
           </a:p>
@@ -5595,8 +5615,25 @@
                 <a:latin typeface="Courier New" pitchFamily="49" charset="0"/>
                 <a:cs typeface="Courier New" pitchFamily="49" charset="0"/>
               </a:rPr>
-              <a:t>Try Assignment 6:     </a:t>
-            </a:r>
+              <a:t>Try Assignment </a:t>
+            </a:r>
+            <a:r>
+              <a:rPr lang="en-US" sz="1400" b="1" dirty="0" smtClean="0">
+                <a:solidFill>
+                  <a:schemeClr val="accent2"/>
+                </a:solidFill>
+                <a:latin typeface="Courier New" pitchFamily="49" charset="0"/>
+                <a:cs typeface="Courier New" pitchFamily="49" charset="0"/>
+              </a:rPr>
+              <a:t>7:     </a:t>
+            </a:r>
+            <a:endParaRPr lang="en-US" sz="1400" b="1" dirty="0" smtClean="0">
+              <a:solidFill>
+                <a:schemeClr val="accent2"/>
+              </a:solidFill>
+              <a:latin typeface="Courier New" pitchFamily="49" charset="0"/>
+              <a:cs typeface="Courier New" pitchFamily="49" charset="0"/>
+            </a:endParaRPr>
           </a:p>
           <a:p>
             <a:pPr marL="0" indent="0">
@@ -5688,7 +5725,15 @@
           <a:p>
             <a:r>
               <a:rPr lang="en-US" dirty="0" smtClean="0"/>
-              <a:t>Example Code from Assignment 5</a:t>
+              <a:t>Example Code from </a:t>
+            </a:r>
+            <a:r>
+              <a:rPr lang="en-US" smtClean="0"/>
+              <a:t>Assignment </a:t>
+            </a:r>
+            <a:r>
+              <a:rPr lang="en-US" smtClean="0"/>
+              <a:t>6</a:t>
             </a:r>
             <a:endParaRPr lang="en-US" dirty="0"/>
           </a:p>
@@ -5779,45 +5824,6 @@
             <a:pPr marL="0" indent="0">
               <a:buNone/>
             </a:pPr>
-            <a:endParaRPr lang="en-US" sz="2400" dirty="0"/>
-          </a:p>
-          <a:p>
-            <a:r>
-              <a:rPr lang="en-US" sz="2400" dirty="0" smtClean="0"/>
-              <a:t>Dr </a:t>
-            </a:r>
-            <a:r>
-              <a:rPr lang="en-US" sz="2400" dirty="0" err="1" smtClean="0"/>
-              <a:t>Coulston’s</a:t>
-            </a:r>
-            <a:r>
-              <a:rPr lang="en-US" sz="2400" dirty="0" smtClean="0"/>
-              <a:t> example</a:t>
-            </a:r>
-          </a:p>
-          <a:p>
-            <a:pPr lvl="1"/>
-            <a:r>
-              <a:rPr lang="en-US" sz="2000" dirty="0" smtClean="0">
-                <a:hlinkClick r:id="rId5"/>
-              </a:rPr>
-              <a:t>Http</a:t>
-            </a:r>
-            <a:r>
-              <a:rPr lang="en-US" sz="2000" dirty="0">
-                <a:hlinkClick r:id="rId5"/>
-              </a:rPr>
-              <a:t>://</a:t>
-            </a:r>
-            <a:r>
-              <a:rPr lang="en-US" sz="2000" dirty="0" smtClean="0">
-                <a:hlinkClick r:id="rId5"/>
-              </a:rPr>
-              <a:t>ecse.bd.psu.edu/cmpen352/lecture/code/lec19.c</a:t>
-            </a:r>
-            <a:endParaRPr lang="en-US" sz="2000" dirty="0" smtClean="0"/>
-          </a:p>
-          <a:p>
             <a:endParaRPr lang="en-US" sz="2400" dirty="0"/>
           </a:p>
           <a:p>

</xml_diff>

<commit_message>
minor updates to lesson notes and slides (missing '//' and mentioned how to change C template in slides)
</commit_message>
<xml_diff>
--- a/notes/L20/Lsn20.pptx
+++ b/notes/L20/Lsn20.pptx
@@ -5,10 +5,10 @@
     <p:sldMasterId id="2147483648" r:id="rId1"/>
   </p:sldMasterIdLst>
   <p:notesMasterIdLst>
-    <p:notesMasterId r:id="rId16"/>
+    <p:notesMasterId r:id="rId17"/>
   </p:notesMasterIdLst>
   <p:handoutMasterIdLst>
-    <p:handoutMasterId r:id="rId17"/>
+    <p:handoutMasterId r:id="rId18"/>
   </p:handoutMasterIdLst>
   <p:sldIdLst>
     <p:sldId id="282" r:id="rId2"/>
@@ -24,7 +24,8 @@
     <p:sldId id="422" r:id="rId12"/>
     <p:sldId id="423" r:id="rId13"/>
     <p:sldId id="424" r:id="rId14"/>
-    <p:sldId id="413" r:id="rId15"/>
+    <p:sldId id="425" r:id="rId15"/>
+    <p:sldId id="413" r:id="rId16"/>
   </p:sldIdLst>
   <p:sldSz cx="9144000" cy="6858000" type="screen4x3"/>
   <p:notesSz cx="6985000" cy="9283700"/>
@@ -4790,27 +4791,57 @@
                 <a:latin typeface="Courier New" pitchFamily="49" charset="0"/>
                 <a:cs typeface="Courier New" pitchFamily="49" charset="0"/>
               </a:rPr>
-              <a:t>                                (estimate)      (actual)</a:t>
-            </a:r>
-          </a:p>
-          <a:p>
-            <a:pPr marL="0" indent="0">
-              <a:buNone/>
-            </a:pPr>
-            <a:r>
-              <a:rPr lang="en-US" sz="1400" b="1" dirty="0">
-                <a:solidFill>
-                  <a:schemeClr val="accent2"/>
-                </a:solidFill>
-                <a:latin typeface="Courier New" pitchFamily="49" charset="0"/>
-                <a:cs typeface="Courier New" pitchFamily="49" charset="0"/>
-              </a:rPr>
-              <a:t>#define PI  (339 / 108)     //  3.139       </a:t>
+              <a:t>                            </a:t>
+            </a:r>
+            <a:r>
+              <a:rPr lang="en-US" sz="1400" b="1" dirty="0" smtClean="0">
+                <a:solidFill>
+                  <a:srgbClr val="00B050"/>
+                </a:solidFill>
+                <a:latin typeface="Courier New" pitchFamily="49" charset="0"/>
+                <a:cs typeface="Courier New" pitchFamily="49" charset="0"/>
+              </a:rPr>
+              <a:t>// </a:t>
+            </a:r>
+            <a:r>
+              <a:rPr lang="en-US" sz="1400" b="1" dirty="0">
+                <a:solidFill>
+                  <a:srgbClr val="00B050"/>
+                </a:solidFill>
+                <a:latin typeface="Courier New" pitchFamily="49" charset="0"/>
+                <a:cs typeface="Courier New" pitchFamily="49" charset="0"/>
+              </a:rPr>
+              <a:t>(estimate)      (actual)</a:t>
+            </a:r>
+          </a:p>
+          <a:p>
+            <a:pPr marL="0" indent="0">
+              <a:buNone/>
+            </a:pPr>
+            <a:r>
+              <a:rPr lang="en-US" sz="1400" b="1" dirty="0">
+                <a:solidFill>
+                  <a:schemeClr val="accent2"/>
+                </a:solidFill>
+                <a:latin typeface="Courier New" pitchFamily="49" charset="0"/>
+                <a:cs typeface="Courier New" pitchFamily="49" charset="0"/>
+              </a:rPr>
+              <a:t>#define PI  (339 / 108)     </a:t>
+            </a:r>
+            <a:r>
+              <a:rPr lang="en-US" sz="1400" b="1" dirty="0">
+                <a:solidFill>
+                  <a:srgbClr val="00B050"/>
+                </a:solidFill>
+                <a:latin typeface="Courier New" pitchFamily="49" charset="0"/>
+                <a:cs typeface="Courier New" pitchFamily="49" charset="0"/>
+              </a:rPr>
+              <a:t>//  3.139       </a:t>
             </a:r>
             <a:r>
               <a:rPr lang="en-US" sz="1400" b="1" dirty="0" err="1">
                 <a:solidFill>
-                  <a:schemeClr val="accent2"/>
+                  <a:srgbClr val="00B050"/>
                 </a:solidFill>
                 <a:latin typeface="Courier New" pitchFamily="49" charset="0"/>
                 <a:cs typeface="Courier New" pitchFamily="49" charset="0"/>
@@ -4820,7 +4851,7 @@
             <a:r>
               <a:rPr lang="en-US" sz="1400" b="1" dirty="0">
                 <a:solidFill>
-                  <a:schemeClr val="accent2"/>
+                  <a:srgbClr val="00B050"/>
                 </a:solidFill>
                 <a:latin typeface="Courier New" pitchFamily="49" charset="0"/>
                 <a:cs typeface="Courier New" pitchFamily="49" charset="0"/>
@@ -4840,12 +4871,22 @@
                 <a:latin typeface="Courier New" pitchFamily="49" charset="0"/>
                 <a:cs typeface="Courier New" pitchFamily="49" charset="0"/>
               </a:rPr>
-              <a:t>#define E  (155 / 57)       //  2.719       </a:t>
+              <a:t>#define E  (155 / 57)       </a:t>
+            </a:r>
+            <a:r>
+              <a:rPr lang="en-US" sz="1400" b="1" dirty="0">
+                <a:solidFill>
+                  <a:srgbClr val="00B050"/>
+                </a:solidFill>
+                <a:latin typeface="Courier New" pitchFamily="49" charset="0"/>
+                <a:cs typeface="Courier New" pitchFamily="49" charset="0"/>
+              </a:rPr>
+              <a:t>//  2.719       </a:t>
             </a:r>
             <a:r>
               <a:rPr lang="en-US" sz="1400" b="1" dirty="0" err="1">
                 <a:solidFill>
-                  <a:schemeClr val="accent2"/>
+                  <a:srgbClr val="00B050"/>
                 </a:solidFill>
                 <a:latin typeface="Courier New" pitchFamily="49" charset="0"/>
                 <a:cs typeface="Courier New" pitchFamily="49" charset="0"/>
@@ -4855,7 +4896,7 @@
             <a:r>
               <a:rPr lang="en-US" sz="1400" b="1" dirty="0">
                 <a:solidFill>
-                  <a:schemeClr val="accent2"/>
+                  <a:srgbClr val="00B050"/>
                 </a:solidFill>
                 <a:latin typeface="Courier New" pitchFamily="49" charset="0"/>
                 <a:cs typeface="Courier New" pitchFamily="49" charset="0"/>
@@ -4869,7 +4910,7 @@
             </a:pPr>
             <a:endParaRPr lang="en-US" sz="1400" b="1" dirty="0">
               <a:solidFill>
-                <a:schemeClr val="accent2"/>
+                <a:srgbClr val="00B050"/>
               </a:solidFill>
               <a:latin typeface="Courier New" pitchFamily="49" charset="0"/>
               <a:cs typeface="Courier New" pitchFamily="49" charset="0"/>
@@ -5574,11 +5615,543 @@
           <a:p>
             <a:r>
               <a:rPr lang="en-US" b="1" dirty="0" smtClean="0"/>
-              <a:t>Assignment </a:t>
-            </a:r>
+              <a:t>Headers !!!!</a:t>
+            </a:r>
+            <a:endParaRPr lang="en-US" dirty="0"/>
+          </a:p>
+        </p:txBody>
+      </p:sp>
+      <p:sp>
+        <p:nvSpPr>
+          <p:cNvPr id="3" name="Content Placeholder 2"/>
+          <p:cNvSpPr>
+            <a:spLocks noGrp="1"/>
+          </p:cNvSpPr>
+          <p:nvPr>
+            <p:ph idx="1"/>
+          </p:nvPr>
+        </p:nvSpPr>
+        <p:spPr>
+          <a:xfrm>
+            <a:off x="275129" y="629194"/>
+            <a:ext cx="8868871" cy="6228806"/>
+          </a:xfrm>
+        </p:spPr>
+        <p:txBody>
+          <a:bodyPr/>
+          <a:lstStyle/>
+          <a:p>
+            <a:pPr marL="400050" lvl="1" indent="0">
+              <a:buNone/>
+            </a:pPr>
+            <a:r>
+              <a:rPr lang="en-US" sz="1000" b="1" dirty="0">
+                <a:solidFill>
+                  <a:srgbClr val="00B050"/>
+                </a:solidFill>
+                <a:latin typeface="Courier New" pitchFamily="49" charset="0"/>
+                <a:cs typeface="Courier New" pitchFamily="49" charset="0"/>
+              </a:rPr>
+              <a:t>/*--------------------------------------------------------------------</a:t>
+            </a:r>
+          </a:p>
+          <a:p>
+            <a:pPr marL="400050" lvl="1" indent="0">
+              <a:buNone/>
+            </a:pPr>
+            <a:r>
+              <a:rPr lang="en-US" sz="1000" b="1" dirty="0">
+                <a:solidFill>
+                  <a:srgbClr val="00B050"/>
+                </a:solidFill>
+                <a:latin typeface="Courier New" pitchFamily="49" charset="0"/>
+                <a:cs typeface="Courier New" pitchFamily="49" charset="0"/>
+              </a:rPr>
+              <a:t>Name:&lt;Your Name&gt;</a:t>
+            </a:r>
+          </a:p>
+          <a:p>
+            <a:pPr marL="400050" lvl="1" indent="0">
+              <a:buNone/>
+            </a:pPr>
+            <a:r>
+              <a:rPr lang="en-US" sz="1000" b="1" dirty="0">
+                <a:solidFill>
+                  <a:srgbClr val="00B050"/>
+                </a:solidFill>
+                <a:latin typeface="Courier New" pitchFamily="49" charset="0"/>
+                <a:cs typeface="Courier New" pitchFamily="49" charset="0"/>
+              </a:rPr>
+              <a:t>Date:&lt;The date you stated working on the file&gt;</a:t>
+            </a:r>
+          </a:p>
+          <a:p>
+            <a:pPr marL="400050" lvl="1" indent="0">
+              <a:buNone/>
+            </a:pPr>
+            <a:r>
+              <a:rPr lang="en-US" sz="1000" b="1" dirty="0">
+                <a:solidFill>
+                  <a:srgbClr val="00B050"/>
+                </a:solidFill>
+                <a:latin typeface="Courier New" pitchFamily="49" charset="0"/>
+                <a:cs typeface="Courier New" pitchFamily="49" charset="0"/>
+              </a:rPr>
+              <a:t>Course: &lt;The course's name&gt;</a:t>
+            </a:r>
+          </a:p>
+          <a:p>
+            <a:pPr marL="400050" lvl="1" indent="0">
+              <a:buNone/>
+            </a:pPr>
+            <a:r>
+              <a:rPr lang="en-US" sz="1000" b="1" dirty="0">
+                <a:solidFill>
+                  <a:srgbClr val="00B050"/>
+                </a:solidFill>
+                <a:latin typeface="Courier New" pitchFamily="49" charset="0"/>
+                <a:cs typeface="Courier New" pitchFamily="49" charset="0"/>
+              </a:rPr>
+              <a:t>File:&lt;This file's name&gt;</a:t>
+            </a:r>
+          </a:p>
+          <a:p>
+            <a:pPr marL="400050" lvl="1" indent="0">
+              <a:buNone/>
+            </a:pPr>
+            <a:r>
+              <a:rPr lang="en-US" sz="1000" b="1" dirty="0">
+                <a:solidFill>
+                  <a:srgbClr val="00B050"/>
+                </a:solidFill>
+                <a:latin typeface="Courier New" pitchFamily="49" charset="0"/>
+                <a:cs typeface="Courier New" pitchFamily="49" charset="0"/>
+              </a:rPr>
+              <a:t>HW: &lt;HW# and name&gt;</a:t>
+            </a:r>
+          </a:p>
+          <a:p>
+            <a:pPr marL="400050" lvl="1" indent="0">
+              <a:buNone/>
+            </a:pPr>
+            <a:endParaRPr lang="en-US" sz="1000" b="1" dirty="0">
+              <a:solidFill>
+                <a:srgbClr val="00B050"/>
+              </a:solidFill>
+              <a:latin typeface="Courier New" pitchFamily="49" charset="0"/>
+              <a:cs typeface="Courier New" pitchFamily="49" charset="0"/>
+            </a:endParaRPr>
+          </a:p>
+          <a:p>
+            <a:pPr marL="400050" lvl="1" indent="0">
+              <a:buNone/>
+            </a:pPr>
+            <a:r>
+              <a:rPr lang="en-US" sz="1000" b="1" dirty="0" err="1">
+                <a:solidFill>
+                  <a:srgbClr val="00B050"/>
+                </a:solidFill>
+                <a:latin typeface="Courier New" pitchFamily="49" charset="0"/>
+                <a:cs typeface="Courier New" pitchFamily="49" charset="0"/>
+              </a:rPr>
+              <a:t>Purp:A</a:t>
+            </a:r>
+            <a:r>
+              <a:rPr lang="en-US" sz="1000" b="1" dirty="0">
+                <a:solidFill>
+                  <a:srgbClr val="00B050"/>
+                </a:solidFill>
+                <a:latin typeface="Courier New" pitchFamily="49" charset="0"/>
+                <a:cs typeface="Courier New" pitchFamily="49" charset="0"/>
+              </a:rPr>
+              <a:t> brief description of what this program does and </a:t>
+            </a:r>
+          </a:p>
+          <a:p>
+            <a:pPr marL="400050" lvl="1" indent="0">
+              <a:buNone/>
+            </a:pPr>
+            <a:r>
+              <a:rPr lang="en-US" sz="1000" b="1" dirty="0">
+                <a:solidFill>
+                  <a:srgbClr val="00B050"/>
+                </a:solidFill>
+                <a:latin typeface="Courier New" pitchFamily="49" charset="0"/>
+                <a:cs typeface="Courier New" pitchFamily="49" charset="0"/>
+              </a:rPr>
+              <a:t>    the general solution strategy. </a:t>
+            </a:r>
+          </a:p>
+          <a:p>
+            <a:pPr marL="400050" lvl="1" indent="0">
+              <a:buNone/>
+            </a:pPr>
+            <a:endParaRPr lang="en-US" sz="1000" b="1" dirty="0">
+              <a:solidFill>
+                <a:srgbClr val="00B050"/>
+              </a:solidFill>
+              <a:latin typeface="Courier New" pitchFamily="49" charset="0"/>
+              <a:cs typeface="Courier New" pitchFamily="49" charset="0"/>
+            </a:endParaRPr>
+          </a:p>
+          <a:p>
+            <a:pPr marL="400050" lvl="1" indent="0">
+              <a:buNone/>
+            </a:pPr>
+            <a:r>
+              <a:rPr lang="en-US" sz="1000" b="1" dirty="0">
+                <a:solidFill>
+                  <a:srgbClr val="00B050"/>
+                </a:solidFill>
+                <a:latin typeface="Courier New" pitchFamily="49" charset="0"/>
+                <a:cs typeface="Courier New" pitchFamily="49" charset="0"/>
+              </a:rPr>
+              <a:t>Doc:    &lt;list the names of the people who you helped&gt;</a:t>
+            </a:r>
+          </a:p>
+          <a:p>
+            <a:pPr marL="400050" lvl="1" indent="0">
+              <a:buNone/>
+            </a:pPr>
+            <a:r>
+              <a:rPr lang="en-US" sz="1000" b="1" dirty="0">
+                <a:solidFill>
+                  <a:srgbClr val="00B050"/>
+                </a:solidFill>
+                <a:latin typeface="Courier New" pitchFamily="49" charset="0"/>
+                <a:cs typeface="Courier New" pitchFamily="49" charset="0"/>
+              </a:rPr>
+              <a:t>        &lt;list the names of the people who assisted you&gt;</a:t>
+            </a:r>
+          </a:p>
+          <a:p>
+            <a:pPr marL="400050" lvl="1" indent="0">
+              <a:buNone/>
+            </a:pPr>
+            <a:endParaRPr lang="en-US" sz="1000" b="1" dirty="0">
+              <a:solidFill>
+                <a:srgbClr val="00B050"/>
+              </a:solidFill>
+              <a:latin typeface="Courier New" pitchFamily="49" charset="0"/>
+              <a:cs typeface="Courier New" pitchFamily="49" charset="0"/>
+            </a:endParaRPr>
+          </a:p>
+          <a:p>
+            <a:pPr marL="400050" lvl="1" indent="0">
+              <a:buNone/>
+            </a:pPr>
+            <a:r>
+              <a:rPr lang="en-US" sz="1000" b="1" dirty="0">
+                <a:solidFill>
+                  <a:srgbClr val="00B050"/>
+                </a:solidFill>
+                <a:latin typeface="Courier New" pitchFamily="49" charset="0"/>
+                <a:cs typeface="Courier New" pitchFamily="49" charset="0"/>
+              </a:rPr>
+              <a:t>Academic Integrity Statement: I certify that, while others may have </a:t>
+            </a:r>
+          </a:p>
+          <a:p>
+            <a:pPr marL="400050" lvl="1" indent="0">
+              <a:buNone/>
+            </a:pPr>
+            <a:r>
+              <a:rPr lang="en-US" sz="1000" b="1" dirty="0">
+                <a:solidFill>
+                  <a:srgbClr val="00B050"/>
+                </a:solidFill>
+                <a:latin typeface="Courier New" pitchFamily="49" charset="0"/>
+                <a:cs typeface="Courier New" pitchFamily="49" charset="0"/>
+              </a:rPr>
+              <a:t>assisted me in brain storming, debugging and validating this program, </a:t>
+            </a:r>
+          </a:p>
+          <a:p>
+            <a:pPr marL="400050" lvl="1" indent="0">
+              <a:buNone/>
+            </a:pPr>
+            <a:r>
+              <a:rPr lang="en-US" sz="1000" b="1" dirty="0">
+                <a:solidFill>
+                  <a:srgbClr val="00B050"/>
+                </a:solidFill>
+                <a:latin typeface="Courier New" pitchFamily="49" charset="0"/>
+                <a:cs typeface="Courier New" pitchFamily="49" charset="0"/>
+              </a:rPr>
+              <a:t>the program itself is my own work. I understand that submitting code </a:t>
+            </a:r>
+          </a:p>
+          <a:p>
+            <a:pPr marL="400050" lvl="1" indent="0">
+              <a:buNone/>
+            </a:pPr>
+            <a:r>
+              <a:rPr lang="en-US" sz="1000" b="1" dirty="0">
+                <a:solidFill>
+                  <a:srgbClr val="00B050"/>
+                </a:solidFill>
+                <a:latin typeface="Courier New" pitchFamily="49" charset="0"/>
+                <a:cs typeface="Courier New" pitchFamily="49" charset="0"/>
+              </a:rPr>
+              <a:t>which is the work of other individuals is a violation of the honor   </a:t>
+            </a:r>
+          </a:p>
+          <a:p>
+            <a:pPr marL="400050" lvl="1" indent="0">
+              <a:buNone/>
+            </a:pPr>
+            <a:r>
+              <a:rPr lang="en-US" sz="1000" b="1" dirty="0">
+                <a:solidFill>
+                  <a:srgbClr val="00B050"/>
+                </a:solidFill>
+                <a:latin typeface="Courier New" pitchFamily="49" charset="0"/>
+                <a:cs typeface="Courier New" pitchFamily="49" charset="0"/>
+              </a:rPr>
+              <a:t>code.  I also understand that if I knowingly give my original work to </a:t>
+            </a:r>
+          </a:p>
+          <a:p>
+            <a:pPr marL="400050" lvl="1" indent="0">
+              <a:buNone/>
+            </a:pPr>
+            <a:r>
+              <a:rPr lang="en-US" sz="1000" b="1" dirty="0">
+                <a:solidFill>
+                  <a:srgbClr val="00B050"/>
+                </a:solidFill>
+                <a:latin typeface="Courier New" pitchFamily="49" charset="0"/>
+                <a:cs typeface="Courier New" pitchFamily="49" charset="0"/>
+              </a:rPr>
+              <a:t>another individual is also a violation of the honor code. </a:t>
+            </a:r>
+          </a:p>
+          <a:p>
+            <a:pPr marL="400050" lvl="1" indent="0">
+              <a:buNone/>
+            </a:pPr>
+            <a:r>
+              <a:rPr lang="en-US" sz="1000" b="1" dirty="0">
+                <a:solidFill>
+                  <a:srgbClr val="00B050"/>
+                </a:solidFill>
+                <a:latin typeface="Courier New" pitchFamily="49" charset="0"/>
+                <a:cs typeface="Courier New" pitchFamily="49" charset="0"/>
+              </a:rPr>
+              <a:t>-------------------------------------------------------------------------*/</a:t>
+            </a:r>
+            <a:endParaRPr lang="en-US" sz="1000" b="1" dirty="0" smtClean="0">
+              <a:solidFill>
+                <a:srgbClr val="00B050"/>
+              </a:solidFill>
+              <a:latin typeface="Courier New" pitchFamily="49" charset="0"/>
+              <a:cs typeface="Courier New" pitchFamily="49" charset="0"/>
+            </a:endParaRPr>
+          </a:p>
+          <a:p>
+            <a:pPr marL="400050" lvl="1" indent="0">
+              <a:buNone/>
+            </a:pPr>
+            <a:endParaRPr lang="en-US" sz="1200" b="1" dirty="0" smtClean="0">
+              <a:solidFill>
+                <a:schemeClr val="accent2"/>
+              </a:solidFill>
+              <a:latin typeface="Courier New" pitchFamily="49" charset="0"/>
+              <a:cs typeface="Courier New" pitchFamily="49" charset="0"/>
+            </a:endParaRPr>
+          </a:p>
+          <a:p>
+            <a:pPr marL="400050" lvl="1" indent="0">
+              <a:buNone/>
+            </a:pPr>
+            <a:r>
+              <a:rPr lang="en-US" sz="1200" b="1" dirty="0" smtClean="0">
+                <a:solidFill>
+                  <a:schemeClr val="accent2"/>
+                </a:solidFill>
+                <a:latin typeface="Courier New" pitchFamily="49" charset="0"/>
+                <a:cs typeface="Courier New" pitchFamily="49" charset="0"/>
+              </a:rPr>
+              <a:t>Want to edit your default empty C template???  Then modify:</a:t>
+            </a:r>
+          </a:p>
+          <a:p>
+            <a:pPr marL="571500" lvl="1" indent="-171450"/>
+            <a:r>
+              <a:rPr lang="en-US" sz="1200" b="1" dirty="0" smtClean="0">
+                <a:solidFill>
+                  <a:schemeClr val="accent2"/>
+                </a:solidFill>
+                <a:latin typeface="Courier New" pitchFamily="49" charset="0"/>
+                <a:cs typeface="Courier New" pitchFamily="49" charset="0"/>
+              </a:rPr>
+              <a:t>C</a:t>
+            </a:r>
+            <a:r>
+              <a:rPr lang="en-US" sz="1200" b="1" dirty="0">
+                <a:solidFill>
+                  <a:schemeClr val="accent2"/>
+                </a:solidFill>
+                <a:latin typeface="Courier New" pitchFamily="49" charset="0"/>
+                <a:cs typeface="Courier New" pitchFamily="49" charset="0"/>
+              </a:rPr>
+              <a:t>:\</a:t>
+            </a:r>
+            <a:r>
+              <a:rPr lang="en-US" sz="1200" b="1" dirty="0">
+                <a:solidFill>
+                  <a:schemeClr val="accent2"/>
+                </a:solidFill>
+                <a:latin typeface="Courier New" pitchFamily="49" charset="0"/>
+                <a:cs typeface="Courier New" pitchFamily="49" charset="0"/>
+              </a:rPr>
+              <a:t>ti\ccsv6\eclipse\plugins\com.ti.ccstudio.project.templates_6.2.0.201604131600\resources\msp430\empty\main.c</a:t>
+            </a:r>
+            <a:endParaRPr lang="en-US" sz="1200" b="1" dirty="0">
+              <a:solidFill>
+                <a:schemeClr val="accent2"/>
+              </a:solidFill>
+              <a:latin typeface="Courier New" pitchFamily="49" charset="0"/>
+              <a:cs typeface="Courier New" pitchFamily="49" charset="0"/>
+            </a:endParaRPr>
+          </a:p>
+          <a:p>
+            <a:pPr marL="400050" lvl="1" indent="0">
+              <a:buNone/>
+            </a:pPr>
+            <a:endParaRPr lang="en-US" sz="1200" b="1" dirty="0">
+              <a:solidFill>
+                <a:srgbClr val="00B050"/>
+              </a:solidFill>
+              <a:latin typeface="Courier New" pitchFamily="49" charset="0"/>
+              <a:cs typeface="Courier New" pitchFamily="49" charset="0"/>
+            </a:endParaRPr>
+          </a:p>
+          <a:p>
+            <a:pPr marL="400050" lvl="1" indent="0">
+              <a:buNone/>
+            </a:pPr>
+            <a:r>
+              <a:rPr lang="en-US" sz="1200" b="1" dirty="0" smtClean="0">
+                <a:solidFill>
+                  <a:schemeClr val="accent2"/>
+                </a:solidFill>
+                <a:latin typeface="Courier New" pitchFamily="49" charset="0"/>
+                <a:cs typeface="Courier New" pitchFamily="49" charset="0"/>
+              </a:rPr>
+              <a:t>Try Assignment </a:t>
+            </a:r>
+            <a:r>
+              <a:rPr lang="en-US" sz="1200" b="1" dirty="0">
+                <a:solidFill>
+                  <a:schemeClr val="accent2"/>
+                </a:solidFill>
+                <a:latin typeface="Courier New" pitchFamily="49" charset="0"/>
+                <a:cs typeface="Courier New" pitchFamily="49" charset="0"/>
+              </a:rPr>
+              <a:t>6</a:t>
+            </a:r>
+            <a:r>
+              <a:rPr lang="en-US" sz="1200" b="1" dirty="0" smtClean="0">
+                <a:solidFill>
+                  <a:schemeClr val="accent2"/>
+                </a:solidFill>
+                <a:latin typeface="Courier New" pitchFamily="49" charset="0"/>
+                <a:cs typeface="Courier New" pitchFamily="49" charset="0"/>
+              </a:rPr>
+              <a:t>:     </a:t>
+            </a:r>
+          </a:p>
+          <a:p>
+            <a:pPr marL="400050" lvl="1" indent="0">
+              <a:buNone/>
+            </a:pPr>
+            <a:r>
+              <a:rPr lang="en-US" sz="1200" b="1" dirty="0">
+                <a:solidFill>
+                  <a:schemeClr val="accent2"/>
+                </a:solidFill>
+                <a:latin typeface="Courier New" pitchFamily="49" charset="0"/>
+                <a:cs typeface="Courier New" pitchFamily="49" charset="0"/>
+              </a:rPr>
+              <a:t>          </a:t>
+            </a:r>
+            <a:r>
+              <a:rPr lang="en-US" sz="1200" b="1" dirty="0">
+                <a:solidFill>
+                  <a:schemeClr val="accent2"/>
+                </a:solidFill>
+                <a:latin typeface="Courier New" pitchFamily="49" charset="0"/>
+                <a:cs typeface="Courier New" pitchFamily="49" charset="0"/>
+                <a:hlinkClick r:id="rId2"/>
+              </a:rPr>
+              <a:t>http://ece.ninja/382/notes/L19/L19_C_basics.html</a:t>
+            </a:r>
+            <a:endParaRPr lang="en-US" sz="1200" b="1" dirty="0" smtClean="0">
+              <a:solidFill>
+                <a:schemeClr val="accent2"/>
+              </a:solidFill>
+              <a:latin typeface="Courier New" pitchFamily="49" charset="0"/>
+              <a:cs typeface="Courier New" pitchFamily="49" charset="0"/>
+            </a:endParaRPr>
+          </a:p>
+        </p:txBody>
+      </p:sp>
+    </p:spTree>
+    <p:extLst>
+      <p:ext uri="{BB962C8B-B14F-4D97-AF65-F5344CB8AC3E}">
+        <p14:creationId xmlns:p14="http://schemas.microsoft.com/office/powerpoint/2010/main" val="2176450260"/>
+      </p:ext>
+    </p:extLst>
+  </p:cSld>
+  <p:clrMapOvr>
+    <a:masterClrMapping/>
+  </p:clrMapOvr>
+  <p:timing>
+    <p:tnLst>
+      <p:par>
+        <p:cTn id="1" dur="indefinite" restart="never" nodeType="tmRoot"/>
+      </p:par>
+    </p:tnLst>
+  </p:timing>
+</p:sld>
+</file>
+
+<file path=ppt/slides/slide15.xml><?xml version="1.0" encoding="utf-8"?>
+<p:sld xmlns:a="http://schemas.openxmlformats.org/drawingml/2006/main" xmlns:r="http://schemas.openxmlformats.org/officeDocument/2006/relationships" xmlns:p="http://schemas.openxmlformats.org/presentationml/2006/main">
+  <p:cSld>
+    <p:spTree>
+      <p:nvGrpSpPr>
+        <p:cNvPr id="1" name=""/>
+        <p:cNvGrpSpPr/>
+        <p:nvPr/>
+      </p:nvGrpSpPr>
+      <p:grpSpPr>
+        <a:xfrm>
+          <a:off x="0" y="0"/>
+          <a:ext cx="0" cy="0"/>
+          <a:chOff x="0" y="0"/>
+          <a:chExt cx="0" cy="0"/>
+        </a:xfrm>
+      </p:grpSpPr>
+      <p:sp>
+        <p:nvSpPr>
+          <p:cNvPr id="2" name="Title 1"/>
+          <p:cNvSpPr>
+            <a:spLocks noGrp="1"/>
+          </p:cNvSpPr>
+          <p:nvPr>
+            <p:ph type="title"/>
+          </p:nvPr>
+        </p:nvSpPr>
+        <p:spPr/>
+        <p:txBody>
+          <a:bodyPr/>
+          <a:lstStyle/>
+          <a:p>
             <a:r>
               <a:rPr lang="en-US" b="1" dirty="0" smtClean="0"/>
-              <a:t>7</a:t>
+              <a:t>Assignment 7</a:t>
             </a:r>
             <a:endParaRPr lang="en-US" dirty="0"/>
           </a:p>
@@ -5615,25 +6188,8 @@
                 <a:latin typeface="Courier New" pitchFamily="49" charset="0"/>
                 <a:cs typeface="Courier New" pitchFamily="49" charset="0"/>
               </a:rPr>
-              <a:t>Try Assignment </a:t>
-            </a:r>
-            <a:r>
-              <a:rPr lang="en-US" sz="1400" b="1" dirty="0" smtClean="0">
-                <a:solidFill>
-                  <a:schemeClr val="accent2"/>
-                </a:solidFill>
-                <a:latin typeface="Courier New" pitchFamily="49" charset="0"/>
-                <a:cs typeface="Courier New" pitchFamily="49" charset="0"/>
-              </a:rPr>
-              <a:t>7:     </a:t>
-            </a:r>
-            <a:endParaRPr lang="en-US" sz="1400" b="1" dirty="0" smtClean="0">
-              <a:solidFill>
-                <a:schemeClr val="accent2"/>
-              </a:solidFill>
-              <a:latin typeface="Courier New" pitchFamily="49" charset="0"/>
-              <a:cs typeface="Courier New" pitchFamily="49" charset="0"/>
-            </a:endParaRPr>
+              <a:t>Try Assignment 7:     </a:t>
+            </a:r>
           </a:p>
           <a:p>
             <a:pPr marL="0" indent="0">
@@ -5729,11 +6285,7 @@
             </a:r>
             <a:r>
               <a:rPr lang="en-US" smtClean="0"/>
-              <a:t>Assignment </a:t>
-            </a:r>
-            <a:r>
-              <a:rPr lang="en-US" smtClean="0"/>
-              <a:t>6</a:t>
+              <a:t>Assignment 6</a:t>
             </a:r>
             <a:endParaRPr lang="en-US" dirty="0"/>
           </a:p>

</xml_diff>